<commit_message>
update bai tren lop
</commit_message>
<xml_diff>
--- a/Nhom9_Buoi7/Nhom9_OpenCV.pptx
+++ b/Nhom9_Buoi7/Nhom9_OpenCV.pptx
@@ -33,11 +33,11 @@
       <p:boldItalic r:id="rId19"/>
     </p:embeddedFont>
     <p:embeddedFont>
-      <p:font typeface="Josefin Sans Bold" panose="020B0604020202020204" charset="0"/>
+      <p:font typeface="Josefin Sans" panose="020B0604020202020204" charset="0"/>
       <p:regular r:id="rId20"/>
     </p:embeddedFont>
     <p:embeddedFont>
-      <p:font typeface="Josefin Sans" panose="020B0604020202020204" charset="0"/>
+      <p:font typeface="Josefin Sans Bold" panose="020B0604020202020204" charset="0"/>
       <p:regular r:id="rId21"/>
     </p:embeddedFont>
   </p:embeddedFontLst>
@@ -4204,7 +4204,7 @@
             <a:blip r:embed="rId3">
               <a:extLst>
                 <a:ext uri="{96DAC541-7B7A-43D3-8B79-37D633B846F1}">
-                  <asvg:svgBlip xmlns:asvg="http://schemas.microsoft.com/office/drawing/2016/SVG/main" xmlns="" r:embed="rId4"/>
+                  <asvg:svgBlip xmlns:asvg="http://schemas.microsoft.com/office/drawing/2016/SVG/main" r:embed="rId4"/>
                 </a:ext>
               </a:extLst>
             </a:blip>
@@ -4256,7 +4256,7 @@
             <a:blip r:embed="rId5">
               <a:extLst>
                 <a:ext uri="{96DAC541-7B7A-43D3-8B79-37D633B846F1}">
-                  <asvg:svgBlip xmlns:asvg="http://schemas.microsoft.com/office/drawing/2016/SVG/main" xmlns="" r:embed="rId6"/>
+                  <asvg:svgBlip xmlns:asvg="http://schemas.microsoft.com/office/drawing/2016/SVG/main" r:embed="rId6"/>
                 </a:ext>
               </a:extLst>
             </a:blip>
@@ -4308,7 +4308,7 @@
             <a:blip r:embed="rId7">
               <a:extLst>
                 <a:ext uri="{96DAC541-7B7A-43D3-8B79-37D633B846F1}">
-                  <asvg:svgBlip xmlns:asvg="http://schemas.microsoft.com/office/drawing/2016/SVG/main" xmlns="" r:embed="rId8"/>
+                  <asvg:svgBlip xmlns:asvg="http://schemas.microsoft.com/office/drawing/2016/SVG/main" r:embed="rId8"/>
                 </a:ext>
               </a:extLst>
             </a:blip>
@@ -4360,7 +4360,7 @@
             <a:blip r:embed="rId9">
               <a:extLst>
                 <a:ext uri="{96DAC541-7B7A-43D3-8B79-37D633B846F1}">
-                  <asvg:svgBlip xmlns:asvg="http://schemas.microsoft.com/office/drawing/2016/SVG/main" xmlns="" r:embed="rId10"/>
+                  <asvg:svgBlip xmlns:asvg="http://schemas.microsoft.com/office/drawing/2016/SVG/main" r:embed="rId10"/>
                 </a:ext>
               </a:extLst>
             </a:blip>
@@ -4412,7 +4412,7 @@
             <a:blip r:embed="rId11">
               <a:extLst>
                 <a:ext uri="{96DAC541-7B7A-43D3-8B79-37D633B846F1}">
-                  <asvg:svgBlip xmlns:asvg="http://schemas.microsoft.com/office/drawing/2016/SVG/main" xmlns="" r:embed="rId12"/>
+                  <asvg:svgBlip xmlns:asvg="http://schemas.microsoft.com/office/drawing/2016/SVG/main" r:embed="rId12"/>
                 </a:ext>
               </a:extLst>
             </a:blip>
@@ -4464,7 +4464,7 @@
             <a:blip r:embed="rId13">
               <a:extLst>
                 <a:ext uri="{96DAC541-7B7A-43D3-8B79-37D633B846F1}">
-                  <asvg:svgBlip xmlns:asvg="http://schemas.microsoft.com/office/drawing/2016/SVG/main" xmlns="" r:embed="rId14"/>
+                  <asvg:svgBlip xmlns:asvg="http://schemas.microsoft.com/office/drawing/2016/SVG/main" r:embed="rId14"/>
                 </a:ext>
               </a:extLst>
             </a:blip>
@@ -4554,7 +4554,7 @@
             <a:blip r:embed="rId3">
               <a:extLst>
                 <a:ext uri="{96DAC541-7B7A-43D3-8B79-37D633B846F1}">
-                  <asvg:svgBlip xmlns:asvg="http://schemas.microsoft.com/office/drawing/2016/SVG/main" xmlns="" r:embed="rId4"/>
+                  <asvg:svgBlip xmlns:asvg="http://schemas.microsoft.com/office/drawing/2016/SVG/main" r:embed="rId4"/>
                 </a:ext>
               </a:extLst>
             </a:blip>
@@ -6030,165 +6030,171 @@
             <a:p>
               <a:pPr>
                 <a:lnSpc>
-                  <a:spcPts val="6413"/>
+                  <a:spcPts val="6314"/>
                 </a:lnSpc>
               </a:pPr>
               <a:r>
-                <a:rPr lang="en-US" sz="4400" dirty="0" err="1">
-                  <a:solidFill>
-                    <a:srgbClr val="F7B4A7"/>
+                <a:rPr lang="en-US" sz="4510" dirty="0" err="1">
+                  <a:solidFill>
+                    <a:schemeClr val="accent6">
+                      <a:lumMod val="60000"/>
+                      <a:lumOff val="40000"/>
+                    </a:schemeClr>
                   </a:solidFill>
                   <a:latin typeface="Josefin Sans Bold"/>
                 </a:rPr>
                 <a:t>Tính</a:t>
               </a:r>
               <a:r>
-                <a:rPr lang="en-US" sz="4400" dirty="0">
-                  <a:solidFill>
-                    <a:srgbClr val="F7B4A7"/>
+                <a:rPr lang="en-US" sz="4510" dirty="0">
+                  <a:solidFill>
+                    <a:schemeClr val="accent6">
+                      <a:lumMod val="60000"/>
+                      <a:lumOff val="40000"/>
+                    </a:schemeClr>
                   </a:solidFill>
                   <a:latin typeface="Josefin Sans Bold"/>
                 </a:rPr>
                 <a:t> </a:t>
               </a:r>
               <a:r>
-                <a:rPr lang="en-US" sz="4400" dirty="0" err="1">
-                  <a:solidFill>
-                    <a:srgbClr val="F7B4A7"/>
+                <a:rPr lang="en-US" sz="4510" dirty="0" err="1">
+                  <a:solidFill>
+                    <a:schemeClr val="accent6">
+                      <a:lumMod val="60000"/>
+                      <a:lumOff val="40000"/>
+                    </a:schemeClr>
                   </a:solidFill>
                   <a:latin typeface="Josefin Sans Bold"/>
                 </a:rPr>
                 <a:t>năng</a:t>
               </a:r>
               <a:r>
-                <a:rPr lang="en-US" sz="4400" dirty="0">
-                  <a:solidFill>
-                    <a:srgbClr val="F7B4A7"/>
+                <a:rPr lang="en-US" sz="4510" dirty="0">
+                  <a:solidFill>
+                    <a:schemeClr val="accent6">
+                      <a:lumMod val="60000"/>
+                      <a:lumOff val="40000"/>
+                    </a:schemeClr>
                   </a:solidFill>
                   <a:latin typeface="Josefin Sans Bold"/>
                 </a:rPr>
                 <a:t> </a:t>
               </a:r>
               <a:r>
-                <a:rPr lang="en-US" sz="4400" dirty="0" err="1">
-                  <a:solidFill>
-                    <a:srgbClr val="F7B4A7"/>
+                <a:rPr lang="en-US" sz="4510" dirty="0" err="1">
+                  <a:solidFill>
+                    <a:schemeClr val="accent6">
+                      <a:lumMod val="60000"/>
+                      <a:lumOff val="40000"/>
+                    </a:schemeClr>
                   </a:solidFill>
                   <a:latin typeface="Josefin Sans Bold"/>
                 </a:rPr>
-                <a:t>phát</a:t>
-              </a:r>
-              <a:r>
-                <a:rPr lang="en-US" sz="4400" dirty="0">
-                  <a:solidFill>
-                    <a:srgbClr val="F7B4A7"/>
+                <a:t>xử</a:t>
+              </a:r>
+              <a:r>
+                <a:rPr lang="en-US" sz="4510" dirty="0">
+                  <a:solidFill>
+                    <a:schemeClr val="accent6">
+                      <a:lumMod val="60000"/>
+                      <a:lumOff val="40000"/>
+                    </a:schemeClr>
                   </a:solidFill>
                   <a:latin typeface="Josefin Sans Bold"/>
                 </a:rPr>
                 <a:t> </a:t>
               </a:r>
               <a:r>
-                <a:rPr lang="en-US" sz="4400" dirty="0" err="1">
-                  <a:solidFill>
-                    <a:srgbClr val="F7B4A7"/>
+                <a:rPr lang="en-US" sz="4510" dirty="0" err="1">
+                  <a:solidFill>
+                    <a:schemeClr val="accent6">
+                      <a:lumMod val="60000"/>
+                      <a:lumOff val="40000"/>
+                    </a:schemeClr>
                   </a:solidFill>
                   <a:latin typeface="Josefin Sans Bold"/>
                 </a:rPr>
-                <a:t>hiện</a:t>
-              </a:r>
-              <a:r>
-                <a:rPr lang="en-US" sz="4400" dirty="0">
-                  <a:solidFill>
-                    <a:srgbClr val="F7B4A7"/>
+                <a:t>lý</a:t>
+              </a:r>
+              <a:r>
+                <a:rPr lang="en-US" sz="4510" dirty="0">
+                  <a:solidFill>
+                    <a:schemeClr val="accent6">
+                      <a:lumMod val="60000"/>
+                      <a:lumOff val="40000"/>
+                    </a:schemeClr>
                   </a:solidFill>
                   <a:latin typeface="Josefin Sans Bold"/>
                 </a:rPr>
                 <a:t> </a:t>
               </a:r>
               <a:r>
-                <a:rPr lang="en-US" sz="4400" dirty="0" err="1">
-                  <a:solidFill>
-                    <a:srgbClr val="F7B4A7"/>
+                <a:rPr lang="en-US" sz="4510" dirty="0" err="1">
+                  <a:solidFill>
+                    <a:schemeClr val="accent6">
+                      <a:lumMod val="60000"/>
+                      <a:lumOff val="40000"/>
+                    </a:schemeClr>
                   </a:solidFill>
                   <a:latin typeface="Josefin Sans Bold"/>
                 </a:rPr>
-                <a:t>và</a:t>
-              </a:r>
-              <a:r>
-                <a:rPr lang="en-US" sz="4400" dirty="0">
-                  <a:solidFill>
-                    <a:srgbClr val="F7B4A7"/>
+                <a:t>ảnh</a:t>
+              </a:r>
+              <a:r>
+                <a:rPr lang="en-US" sz="4510" dirty="0">
+                  <a:solidFill>
+                    <a:schemeClr val="accent6">
+                      <a:lumMod val="60000"/>
+                      <a:lumOff val="40000"/>
+                    </a:schemeClr>
                   </a:solidFill>
                   <a:latin typeface="Josefin Sans Bold"/>
                 </a:rPr>
                 <a:t> </a:t>
               </a:r>
               <a:r>
-                <a:rPr lang="en-US" sz="4400" dirty="0" err="1">
-                  <a:solidFill>
-                    <a:srgbClr val="F7B4A7"/>
+                <a:rPr lang="en-US" sz="4510" dirty="0" err="1">
+                  <a:solidFill>
+                    <a:schemeClr val="accent6">
+                      <a:lumMod val="60000"/>
+                      <a:lumOff val="40000"/>
+                    </a:schemeClr>
                   </a:solidFill>
                   <a:latin typeface="Josefin Sans Bold"/>
                 </a:rPr>
-                <a:t>nhận</a:t>
-              </a:r>
-              <a:r>
-                <a:rPr lang="en-US" sz="4400" dirty="0">
-                  <a:solidFill>
-                    <a:srgbClr val="F7B4A7"/>
+                <a:t>cơ</a:t>
+              </a:r>
+              <a:r>
+                <a:rPr lang="en-US" sz="4510" dirty="0">
+                  <a:solidFill>
+                    <a:schemeClr val="accent6">
+                      <a:lumMod val="60000"/>
+                      <a:lumOff val="40000"/>
+                    </a:schemeClr>
                   </a:solidFill>
                   <a:latin typeface="Josefin Sans Bold"/>
                 </a:rPr>
                 <a:t> </a:t>
               </a:r>
               <a:r>
-                <a:rPr lang="en-US" sz="4400" dirty="0" err="1">
-                  <a:solidFill>
-                    <a:srgbClr val="F7B4A7"/>
+                <a:rPr lang="en-US" sz="4510" dirty="0" err="1">
+                  <a:solidFill>
+                    <a:schemeClr val="accent6">
+                      <a:lumMod val="60000"/>
+                      <a:lumOff val="40000"/>
+                    </a:schemeClr>
                   </a:solidFill>
                   <a:latin typeface="Josefin Sans Bold"/>
                 </a:rPr>
-                <a:t>dạng</a:t>
-              </a:r>
-              <a:r>
-                <a:rPr lang="en-US" sz="4400" dirty="0">
-                  <a:solidFill>
-                    <a:srgbClr val="F7B4A7"/>
-                  </a:solidFill>
-                  <a:latin typeface="Josefin Sans Bold"/>
-                </a:rPr>
-                <a:t> </a:t>
-              </a:r>
-              <a:r>
-                <a:rPr lang="en-US" sz="4400" dirty="0" err="1">
-                  <a:solidFill>
-                    <a:srgbClr val="F7B4A7"/>
-                  </a:solidFill>
-                  <a:latin typeface="Josefin Sans Bold"/>
-                </a:rPr>
-                <a:t>vật</a:t>
-              </a:r>
-              <a:r>
-                <a:rPr lang="en-US" sz="4400" dirty="0">
-                  <a:solidFill>
-                    <a:srgbClr val="F7B4A7"/>
-                  </a:solidFill>
-                  <a:latin typeface="Josefin Sans Bold"/>
-                </a:rPr>
-                <a:t> </a:t>
-              </a:r>
-              <a:r>
-                <a:rPr lang="en-US" sz="4400" dirty="0" err="1">
-                  <a:solidFill>
-                    <a:srgbClr val="F7B4A7"/>
-                  </a:solidFill>
-                  <a:latin typeface="Josefin Sans Bold"/>
-                </a:rPr>
-                <a:t>thể</a:t>
-              </a:r>
-              <a:endParaRPr lang="en-US" sz="4400" dirty="0">
+                <a:t>bản</a:t>
+              </a:r>
+              <a:endParaRPr lang="en-US" sz="4510" dirty="0">
                 <a:solidFill>
-                  <a:srgbClr val="F7B4A7"/>
+                  <a:schemeClr val="accent6">
+                    <a:lumMod val="60000"/>
+                    <a:lumOff val="40000"/>
+                  </a:schemeClr>
                 </a:solidFill>
                 <a:latin typeface="Josefin Sans Bold"/>
               </a:endParaRPr>
@@ -6276,7 +6282,7 @@
             <a:blip r:embed="rId3">
               <a:extLst>
                 <a:ext uri="{96DAC541-7B7A-43D3-8B79-37D633B846F1}">
-                  <asvg:svgBlip xmlns:asvg="http://schemas.microsoft.com/office/drawing/2016/SVG/main" xmlns="" r:embed="rId4"/>
+                  <asvg:svgBlip xmlns:asvg="http://schemas.microsoft.com/office/drawing/2016/SVG/main" r:embed="rId4"/>
                 </a:ext>
               </a:extLst>
             </a:blip>
@@ -7378,165 +7384,171 @@
             <a:p>
               <a:pPr>
                 <a:lnSpc>
-                  <a:spcPts val="6413"/>
+                  <a:spcPts val="6314"/>
                 </a:lnSpc>
               </a:pPr>
               <a:r>
-                <a:rPr lang="en-US" sz="4400" dirty="0" err="1">
-                  <a:solidFill>
-                    <a:srgbClr val="F7B4A7"/>
+                <a:rPr lang="en-US" sz="4510" dirty="0" err="1">
+                  <a:solidFill>
+                    <a:schemeClr val="accent6">
+                      <a:lumMod val="60000"/>
+                      <a:lumOff val="40000"/>
+                    </a:schemeClr>
                   </a:solidFill>
                   <a:latin typeface="Josefin Sans Bold"/>
                 </a:rPr>
                 <a:t>Tính</a:t>
               </a:r>
               <a:r>
-                <a:rPr lang="en-US" sz="4400" dirty="0">
-                  <a:solidFill>
-                    <a:srgbClr val="F7B4A7"/>
+                <a:rPr lang="en-US" sz="4510" dirty="0">
+                  <a:solidFill>
+                    <a:schemeClr val="accent6">
+                      <a:lumMod val="60000"/>
+                      <a:lumOff val="40000"/>
+                    </a:schemeClr>
                   </a:solidFill>
                   <a:latin typeface="Josefin Sans Bold"/>
                 </a:rPr>
                 <a:t> </a:t>
               </a:r>
               <a:r>
-                <a:rPr lang="en-US" sz="4400" dirty="0" err="1">
-                  <a:solidFill>
-                    <a:srgbClr val="F7B4A7"/>
+                <a:rPr lang="en-US" sz="4510" dirty="0" err="1">
+                  <a:solidFill>
+                    <a:schemeClr val="accent6">
+                      <a:lumMod val="60000"/>
+                      <a:lumOff val="40000"/>
+                    </a:schemeClr>
                   </a:solidFill>
                   <a:latin typeface="Josefin Sans Bold"/>
                 </a:rPr>
                 <a:t>năng</a:t>
               </a:r>
               <a:r>
-                <a:rPr lang="en-US" sz="4400" dirty="0">
-                  <a:solidFill>
-                    <a:srgbClr val="F7B4A7"/>
+                <a:rPr lang="en-US" sz="4510" dirty="0">
+                  <a:solidFill>
+                    <a:schemeClr val="accent6">
+                      <a:lumMod val="60000"/>
+                      <a:lumOff val="40000"/>
+                    </a:schemeClr>
                   </a:solidFill>
                   <a:latin typeface="Josefin Sans Bold"/>
                 </a:rPr>
                 <a:t> </a:t>
               </a:r>
               <a:r>
-                <a:rPr lang="en-US" sz="4400" dirty="0" err="1">
-                  <a:solidFill>
-                    <a:srgbClr val="F7B4A7"/>
+                <a:rPr lang="en-US" sz="4510" dirty="0" err="1">
+                  <a:solidFill>
+                    <a:schemeClr val="accent6">
+                      <a:lumMod val="60000"/>
+                      <a:lumOff val="40000"/>
+                    </a:schemeClr>
                   </a:solidFill>
                   <a:latin typeface="Josefin Sans Bold"/>
                 </a:rPr>
-                <a:t>phát</a:t>
-              </a:r>
-              <a:r>
-                <a:rPr lang="en-US" sz="4400" dirty="0">
-                  <a:solidFill>
-                    <a:srgbClr val="F7B4A7"/>
+                <a:t>xử</a:t>
+              </a:r>
+              <a:r>
+                <a:rPr lang="en-US" sz="4510" dirty="0">
+                  <a:solidFill>
+                    <a:schemeClr val="accent6">
+                      <a:lumMod val="60000"/>
+                      <a:lumOff val="40000"/>
+                    </a:schemeClr>
                   </a:solidFill>
                   <a:latin typeface="Josefin Sans Bold"/>
                 </a:rPr>
                 <a:t> </a:t>
               </a:r>
               <a:r>
-                <a:rPr lang="en-US" sz="4400" dirty="0" err="1">
-                  <a:solidFill>
-                    <a:srgbClr val="F7B4A7"/>
+                <a:rPr lang="en-US" sz="4510" dirty="0" err="1">
+                  <a:solidFill>
+                    <a:schemeClr val="accent6">
+                      <a:lumMod val="60000"/>
+                      <a:lumOff val="40000"/>
+                    </a:schemeClr>
                   </a:solidFill>
                   <a:latin typeface="Josefin Sans Bold"/>
                 </a:rPr>
-                <a:t>hiện</a:t>
-              </a:r>
-              <a:r>
-                <a:rPr lang="en-US" sz="4400" dirty="0">
-                  <a:solidFill>
-                    <a:srgbClr val="F7B4A7"/>
+                <a:t>lý</a:t>
+              </a:r>
+              <a:r>
+                <a:rPr lang="en-US" sz="4510" dirty="0">
+                  <a:solidFill>
+                    <a:schemeClr val="accent6">
+                      <a:lumMod val="60000"/>
+                      <a:lumOff val="40000"/>
+                    </a:schemeClr>
                   </a:solidFill>
                   <a:latin typeface="Josefin Sans Bold"/>
                 </a:rPr>
                 <a:t> </a:t>
               </a:r>
               <a:r>
-                <a:rPr lang="en-US" sz="4400" dirty="0" err="1">
-                  <a:solidFill>
-                    <a:srgbClr val="F7B4A7"/>
+                <a:rPr lang="en-US" sz="4510" dirty="0" err="1">
+                  <a:solidFill>
+                    <a:schemeClr val="accent6">
+                      <a:lumMod val="60000"/>
+                      <a:lumOff val="40000"/>
+                    </a:schemeClr>
                   </a:solidFill>
                   <a:latin typeface="Josefin Sans Bold"/>
                 </a:rPr>
-                <a:t>và</a:t>
-              </a:r>
-              <a:r>
-                <a:rPr lang="en-US" sz="4400" dirty="0">
-                  <a:solidFill>
-                    <a:srgbClr val="F7B4A7"/>
+                <a:t>ảnh</a:t>
+              </a:r>
+              <a:r>
+                <a:rPr lang="en-US" sz="4510" dirty="0">
+                  <a:solidFill>
+                    <a:schemeClr val="accent6">
+                      <a:lumMod val="60000"/>
+                      <a:lumOff val="40000"/>
+                    </a:schemeClr>
                   </a:solidFill>
                   <a:latin typeface="Josefin Sans Bold"/>
                 </a:rPr>
                 <a:t> </a:t>
               </a:r>
               <a:r>
-                <a:rPr lang="en-US" sz="4400" dirty="0" err="1">
-                  <a:solidFill>
-                    <a:srgbClr val="F7B4A7"/>
+                <a:rPr lang="en-US" sz="4510" dirty="0" err="1">
+                  <a:solidFill>
+                    <a:schemeClr val="accent6">
+                      <a:lumMod val="60000"/>
+                      <a:lumOff val="40000"/>
+                    </a:schemeClr>
                   </a:solidFill>
                   <a:latin typeface="Josefin Sans Bold"/>
                 </a:rPr>
-                <a:t>nhận</a:t>
-              </a:r>
-              <a:r>
-                <a:rPr lang="en-US" sz="4400" dirty="0">
-                  <a:solidFill>
-                    <a:srgbClr val="F7B4A7"/>
+                <a:t>cơ</a:t>
+              </a:r>
+              <a:r>
+                <a:rPr lang="en-US" sz="4510" dirty="0">
+                  <a:solidFill>
+                    <a:schemeClr val="accent6">
+                      <a:lumMod val="60000"/>
+                      <a:lumOff val="40000"/>
+                    </a:schemeClr>
                   </a:solidFill>
                   <a:latin typeface="Josefin Sans Bold"/>
                 </a:rPr>
                 <a:t> </a:t>
               </a:r>
               <a:r>
-                <a:rPr lang="en-US" sz="4400" dirty="0" err="1">
-                  <a:solidFill>
-                    <a:srgbClr val="F7B4A7"/>
+                <a:rPr lang="en-US" sz="4510" dirty="0" err="1">
+                  <a:solidFill>
+                    <a:schemeClr val="accent6">
+                      <a:lumMod val="60000"/>
+                      <a:lumOff val="40000"/>
+                    </a:schemeClr>
                   </a:solidFill>
                   <a:latin typeface="Josefin Sans Bold"/>
                 </a:rPr>
-                <a:t>dạng</a:t>
-              </a:r>
-              <a:r>
-                <a:rPr lang="en-US" sz="4400" dirty="0">
-                  <a:solidFill>
-                    <a:srgbClr val="F7B4A7"/>
-                  </a:solidFill>
-                  <a:latin typeface="Josefin Sans Bold"/>
-                </a:rPr>
-                <a:t> </a:t>
-              </a:r>
-              <a:r>
-                <a:rPr lang="en-US" sz="4400" dirty="0" err="1">
-                  <a:solidFill>
-                    <a:srgbClr val="F7B4A7"/>
-                  </a:solidFill>
-                  <a:latin typeface="Josefin Sans Bold"/>
-                </a:rPr>
-                <a:t>vật</a:t>
-              </a:r>
-              <a:r>
-                <a:rPr lang="en-US" sz="4400" dirty="0">
-                  <a:solidFill>
-                    <a:srgbClr val="F7B4A7"/>
-                  </a:solidFill>
-                  <a:latin typeface="Josefin Sans Bold"/>
-                </a:rPr>
-                <a:t> </a:t>
-              </a:r>
-              <a:r>
-                <a:rPr lang="en-US" sz="4400" dirty="0" err="1">
-                  <a:solidFill>
-                    <a:srgbClr val="F7B4A7"/>
-                  </a:solidFill>
-                  <a:latin typeface="Josefin Sans Bold"/>
-                </a:rPr>
-                <a:t>thể</a:t>
-              </a:r>
-              <a:endParaRPr lang="en-US" sz="4400" dirty="0">
+                <a:t>bản</a:t>
+              </a:r>
+              <a:endParaRPr lang="en-US" sz="4510" dirty="0">
                 <a:solidFill>
-                  <a:srgbClr val="F7B4A7"/>
+                  <a:schemeClr val="accent6">
+                    <a:lumMod val="60000"/>
+                    <a:lumOff val="40000"/>
+                  </a:schemeClr>
                 </a:solidFill>
                 <a:latin typeface="Josefin Sans Bold"/>
               </a:endParaRPr>
@@ -7624,7 +7636,7 @@
             <a:blip r:embed="rId2">
               <a:extLst>
                 <a:ext uri="{96DAC541-7B7A-43D3-8B79-37D633B846F1}">
-                  <asvg:svgBlip xmlns:asvg="http://schemas.microsoft.com/office/drawing/2016/SVG/main" xmlns="" r:embed="rId3"/>
+                  <asvg:svgBlip xmlns:asvg="http://schemas.microsoft.com/office/drawing/2016/SVG/main" r:embed="rId3"/>
                 </a:ext>
               </a:extLst>
             </a:blip>
@@ -27329,13 +27341,13 @@
   <p:clrMapOvr>
     <a:masterClrMapping/>
   </p:clrMapOvr>
-  <mc:AlternateContent xmlns:mc="http://schemas.openxmlformats.org/markup-compatibility/2006">
-    <mc:Choice xmlns:p159="http://schemas.microsoft.com/office/powerpoint/2015/09/main" xmlns="" Requires="p159">
+  <mc:AlternateContent xmlns:mc="http://schemas.openxmlformats.org/markup-compatibility/2006" xmlns:p159="http://schemas.microsoft.com/office/powerpoint/2015/09/main">
+    <mc:Choice Requires="p159">
       <p:transition xmlns:p14="http://schemas.microsoft.com/office/powerpoint/2010/main" spd="slow" p14:dur="2000">
         <p159:morph option="byObject"/>
       </p:transition>
     </mc:Choice>
-    <mc:Fallback>
+    <mc:Fallback xmlns="">
       <p:transition spd="slow">
         <p:fade/>
       </p:transition>
@@ -27566,7 +27578,7 @@
             <a:blip r:embed="rId2">
               <a:extLst>
                 <a:ext uri="{96DAC541-7B7A-43D3-8B79-37D633B846F1}">
-                  <asvg:svgBlip xmlns:asvg="http://schemas.microsoft.com/office/drawing/2016/SVG/main" xmlns="" r:embed="rId3"/>
+                  <asvg:svgBlip xmlns:asvg="http://schemas.microsoft.com/office/drawing/2016/SVG/main" r:embed="rId3"/>
                 </a:ext>
               </a:extLst>
             </a:blip>
@@ -27618,7 +27630,7 @@
             <a:blip r:embed="rId4">
               <a:extLst>
                 <a:ext uri="{96DAC541-7B7A-43D3-8B79-37D633B846F1}">
-                  <asvg:svgBlip xmlns:asvg="http://schemas.microsoft.com/office/drawing/2016/SVG/main" xmlns="" r:embed="rId5"/>
+                  <asvg:svgBlip xmlns:asvg="http://schemas.microsoft.com/office/drawing/2016/SVG/main" r:embed="rId5"/>
                 </a:ext>
               </a:extLst>
             </a:blip>
@@ -27670,7 +27682,7 @@
             <a:blip r:embed="rId6">
               <a:extLst>
                 <a:ext uri="{96DAC541-7B7A-43D3-8B79-37D633B846F1}">
-                  <asvg:svgBlip xmlns:asvg="http://schemas.microsoft.com/office/drawing/2016/SVG/main" xmlns="" r:embed="rId7"/>
+                  <asvg:svgBlip xmlns:asvg="http://schemas.microsoft.com/office/drawing/2016/SVG/main" r:embed="rId7"/>
                 </a:ext>
               </a:extLst>
             </a:blip>
@@ -27722,7 +27734,7 @@
             <a:blip r:embed="rId8">
               <a:extLst>
                 <a:ext uri="{96DAC541-7B7A-43D3-8B79-37D633B846F1}">
-                  <asvg:svgBlip xmlns:asvg="http://schemas.microsoft.com/office/drawing/2016/SVG/main" xmlns="" r:embed="rId9"/>
+                  <asvg:svgBlip xmlns:asvg="http://schemas.microsoft.com/office/drawing/2016/SVG/main" r:embed="rId9"/>
                 </a:ext>
               </a:extLst>
             </a:blip>
@@ -27774,7 +27786,7 @@
             <a:blip r:embed="rId10">
               <a:extLst>
                 <a:ext uri="{96DAC541-7B7A-43D3-8B79-37D633B846F1}">
-                  <asvg:svgBlip xmlns:asvg="http://schemas.microsoft.com/office/drawing/2016/SVG/main" xmlns="" r:embed="rId11"/>
+                  <asvg:svgBlip xmlns:asvg="http://schemas.microsoft.com/office/drawing/2016/SVG/main" r:embed="rId11"/>
                 </a:ext>
               </a:extLst>
             </a:blip>
@@ -27826,7 +27838,7 @@
             <a:blip r:embed="rId12">
               <a:extLst>
                 <a:ext uri="{96DAC541-7B7A-43D3-8B79-37D633B846F1}">
-                  <asvg:svgBlip xmlns:asvg="http://schemas.microsoft.com/office/drawing/2016/SVG/main" xmlns="" r:embed="rId13"/>
+                  <asvg:svgBlip xmlns:asvg="http://schemas.microsoft.com/office/drawing/2016/SVG/main" r:embed="rId13"/>
                 </a:ext>
               </a:extLst>
             </a:blip>
@@ -28058,7 +28070,7 @@
             <a:blip r:embed="rId2">
               <a:extLst>
                 <a:ext uri="{96DAC541-7B7A-43D3-8B79-37D633B846F1}">
-                  <asvg:svgBlip xmlns:asvg="http://schemas.microsoft.com/office/drawing/2016/SVG/main" xmlns="" r:embed="rId3"/>
+                  <asvg:svgBlip xmlns:asvg="http://schemas.microsoft.com/office/drawing/2016/SVG/main" r:embed="rId3"/>
                 </a:ext>
               </a:extLst>
             </a:blip>
@@ -28110,7 +28122,7 @@
             <a:blip r:embed="rId4">
               <a:extLst>
                 <a:ext uri="{96DAC541-7B7A-43D3-8B79-37D633B846F1}">
-                  <asvg:svgBlip xmlns:asvg="http://schemas.microsoft.com/office/drawing/2016/SVG/main" xmlns="" r:embed="rId5"/>
+                  <asvg:svgBlip xmlns:asvg="http://schemas.microsoft.com/office/drawing/2016/SVG/main" r:embed="rId5"/>
                 </a:ext>
               </a:extLst>
             </a:blip>
@@ -28162,7 +28174,7 @@
             <a:blip r:embed="rId6">
               <a:extLst>
                 <a:ext uri="{96DAC541-7B7A-43D3-8B79-37D633B846F1}">
-                  <asvg:svgBlip xmlns:asvg="http://schemas.microsoft.com/office/drawing/2016/SVG/main" xmlns="" r:embed="rId7"/>
+                  <asvg:svgBlip xmlns:asvg="http://schemas.microsoft.com/office/drawing/2016/SVG/main" r:embed="rId7"/>
                 </a:ext>
               </a:extLst>
             </a:blip>
@@ -28868,7 +28880,7 @@
             <a:blip r:embed="rId2">
               <a:extLst>
                 <a:ext uri="{96DAC541-7B7A-43D3-8B79-37D633B846F1}">
-                  <asvg:svgBlip xmlns:asvg="http://schemas.microsoft.com/office/drawing/2016/SVG/main" xmlns="" r:embed="rId3"/>
+                  <asvg:svgBlip xmlns:asvg="http://schemas.microsoft.com/office/drawing/2016/SVG/main" r:embed="rId3"/>
                 </a:ext>
               </a:extLst>
             </a:blip>
@@ -28920,7 +28932,7 @@
             <a:blip r:embed="rId4">
               <a:extLst>
                 <a:ext uri="{96DAC541-7B7A-43D3-8B79-37D633B846F1}">
-                  <asvg:svgBlip xmlns:asvg="http://schemas.microsoft.com/office/drawing/2016/SVG/main" xmlns="" r:embed="rId5"/>
+                  <asvg:svgBlip xmlns:asvg="http://schemas.microsoft.com/office/drawing/2016/SVG/main" r:embed="rId5"/>
                 </a:ext>
               </a:extLst>
             </a:blip>
@@ -28972,7 +28984,7 @@
             <a:blip r:embed="rId6">
               <a:extLst>
                 <a:ext uri="{96DAC541-7B7A-43D3-8B79-37D633B846F1}">
-                  <asvg:svgBlip xmlns:asvg="http://schemas.microsoft.com/office/drawing/2016/SVG/main" xmlns="" r:embed="rId7"/>
+                  <asvg:svgBlip xmlns:asvg="http://schemas.microsoft.com/office/drawing/2016/SVG/main" r:embed="rId7"/>
                 </a:ext>
               </a:extLst>
             </a:blip>
@@ -29062,7 +29074,7 @@
             <a:blip r:embed="rId2">
               <a:extLst>
                 <a:ext uri="{96DAC541-7B7A-43D3-8B79-37D633B846F1}">
-                  <asvg:svgBlip xmlns:asvg="http://schemas.microsoft.com/office/drawing/2016/SVG/main" xmlns="" r:embed="rId3"/>
+                  <asvg:svgBlip xmlns:asvg="http://schemas.microsoft.com/office/drawing/2016/SVG/main" r:embed="rId3"/>
                 </a:ext>
               </a:extLst>
             </a:blip>
@@ -30657,7 +30669,7 @@
             <a:blip r:embed="rId2">
               <a:extLst>
                 <a:ext uri="{96DAC541-7B7A-43D3-8B79-37D633B846F1}">
-                  <asvg:svgBlip xmlns:asvg="http://schemas.microsoft.com/office/drawing/2016/SVG/main" xmlns="" r:embed="rId3"/>
+                  <asvg:svgBlip xmlns:asvg="http://schemas.microsoft.com/office/drawing/2016/SVG/main" r:embed="rId3"/>
                 </a:ext>
               </a:extLst>
             </a:blip>
@@ -32069,7 +32081,7 @@
             <a:blip r:embed="rId2">
               <a:extLst>
                 <a:ext uri="{96DAC541-7B7A-43D3-8B79-37D633B846F1}">
-                  <asvg:svgBlip xmlns:asvg="http://schemas.microsoft.com/office/drawing/2016/SVG/main" xmlns="" r:embed="rId3"/>
+                  <asvg:svgBlip xmlns:asvg="http://schemas.microsoft.com/office/drawing/2016/SVG/main" r:embed="rId3"/>
                 </a:ext>
               </a:extLst>
             </a:blip>

</xml_diff>